<commit_message>
Update the presentation part 2 and docx
</commit_message>
<xml_diff>
--- a/MySQL BASICS.pptx
+++ b/MySQL BASICS.pptx
@@ -12,9 +12,13 @@
     <p:sldId id="260" r:id="rId6"/>
     <p:sldId id="261" r:id="rId7"/>
     <p:sldId id="265" r:id="rId8"/>
-    <p:sldId id="262" r:id="rId9"/>
-    <p:sldId id="263" r:id="rId10"/>
-    <p:sldId id="264" r:id="rId11"/>
+    <p:sldId id="266" r:id="rId9"/>
+    <p:sldId id="267" r:id="rId10"/>
+    <p:sldId id="268" r:id="rId11"/>
+    <p:sldId id="269" r:id="rId12"/>
+    <p:sldId id="262" r:id="rId13"/>
+    <p:sldId id="263" r:id="rId14"/>
+    <p:sldId id="264" r:id="rId15"/>
   </p:sldIdLst>
   <p:sldSz cx="12192000" cy="6858000"/>
   <p:notesSz cx="6858000" cy="9144000"/>
@@ -113,6 +117,11 @@
       </a:defRPr>
     </a:lvl9pPr>
   </p:defaultTextStyle>
+  <p:extLst>
+    <p:ext uri="{EFAFB233-063F-42B5-8137-9DF3F51BA10A}">
+      <p15:sldGuideLst xmlns:p15="http://schemas.microsoft.com/office/powerpoint/2012/main"/>
+    </p:ext>
+  </p:extLst>
 </p:presentation>
 </file>
 
@@ -862,7 +871,7 @@
             <a:fld id="{B61BEF0D-F0BB-DE4B-95CE-6DB70DBA9567}" type="datetimeFigureOut">
               <a:rPr lang="en-US" dirty="0"/>
               <a:pPr/>
-              <a:t>12/3/2019</a:t>
+              <a:t>12/4/2019</a:t>
             </a:fld>
             <a:endParaRPr lang="en-US" dirty="0"/>
           </a:p>
@@ -1110,7 +1119,7 @@
             <a:fld id="{B61BEF0D-F0BB-DE4B-95CE-6DB70DBA9567}" type="datetimeFigureOut">
               <a:rPr lang="en-US" dirty="0"/>
               <a:pPr/>
-              <a:t>12/3/2019</a:t>
+              <a:t>12/4/2019</a:t>
             </a:fld>
             <a:endParaRPr lang="en-US" dirty="0"/>
           </a:p>
@@ -1421,7 +1430,7 @@
             <a:fld id="{B61BEF0D-F0BB-DE4B-95CE-6DB70DBA9567}" type="datetimeFigureOut">
               <a:rPr lang="en-US" dirty="0"/>
               <a:pPr/>
-              <a:t>12/3/2019</a:t>
+              <a:t>12/4/2019</a:t>
             </a:fld>
             <a:endParaRPr lang="en-US" dirty="0"/>
           </a:p>
@@ -1751,7 +1760,7 @@
             <a:fld id="{B61BEF0D-F0BB-DE4B-95CE-6DB70DBA9567}" type="datetimeFigureOut">
               <a:rPr lang="en-US" dirty="0"/>
               <a:pPr/>
-              <a:t>12/3/2019</a:t>
+              <a:t>12/4/2019</a:t>
             </a:fld>
             <a:endParaRPr lang="en-US" dirty="0"/>
           </a:p>
@@ -2062,7 +2071,7 @@
             <a:fld id="{B61BEF0D-F0BB-DE4B-95CE-6DB70DBA9567}" type="datetimeFigureOut">
               <a:rPr lang="en-US" dirty="0"/>
               <a:pPr/>
-              <a:t>12/3/2019</a:t>
+              <a:t>12/4/2019</a:t>
             </a:fld>
             <a:endParaRPr lang="en-US" dirty="0"/>
           </a:p>
@@ -2452,7 +2461,7 @@
             <a:fld id="{B61BEF0D-F0BB-DE4B-95CE-6DB70DBA9567}" type="datetimeFigureOut">
               <a:rPr lang="en-US" dirty="0"/>
               <a:pPr/>
-              <a:t>12/3/2019</a:t>
+              <a:t>12/4/2019</a:t>
             </a:fld>
             <a:endParaRPr lang="en-US" dirty="0"/>
           </a:p>
@@ -2618,7 +2627,7 @@
           <a:p>
             <a:fld id="{55C6B4A9-1611-4792-9094-5F34BCA07E0B}" type="datetimeFigureOut">
               <a:rPr lang="en-US" dirty="0"/>
-              <a:t>12/3/2019</a:t>
+              <a:t>12/4/2019</a:t>
             </a:fld>
             <a:endParaRPr lang="en-US" dirty="0"/>
           </a:p>
@@ -2794,7 +2803,7 @@
             <a:fld id="{B61BEF0D-F0BB-DE4B-95CE-6DB70DBA9567}" type="datetimeFigureOut">
               <a:rPr lang="en-US" dirty="0"/>
               <a:pPr/>
-              <a:t>12/3/2019</a:t>
+              <a:t>12/4/2019</a:t>
             </a:fld>
             <a:endParaRPr lang="en-US" dirty="0"/>
           </a:p>
@@ -2960,7 +2969,7 @@
           <a:p>
             <a:fld id="{42A54C80-263E-416B-A8E0-580EDEADCBDC}" type="datetimeFigureOut">
               <a:rPr lang="en-US" dirty="0"/>
-              <a:t>12/3/2019</a:t>
+              <a:t>12/4/2019</a:t>
             </a:fld>
             <a:endParaRPr lang="en-US" dirty="0"/>
           </a:p>
@@ -3203,7 +3212,7 @@
             <a:fld id="{B61BEF0D-F0BB-DE4B-95CE-6DB70DBA9567}" type="datetimeFigureOut">
               <a:rPr lang="en-US" dirty="0"/>
               <a:pPr/>
-              <a:t>12/3/2019</a:t>
+              <a:t>12/4/2019</a:t>
             </a:fld>
             <a:endParaRPr lang="en-US" dirty="0"/>
           </a:p>
@@ -3431,7 +3440,7 @@
           <a:p>
             <a:fld id="{42A54C80-263E-416B-A8E0-580EDEADCBDC}" type="datetimeFigureOut">
               <a:rPr lang="en-US" dirty="0"/>
-              <a:t>12/3/2019</a:t>
+              <a:t>12/4/2019</a:t>
             </a:fld>
             <a:endParaRPr lang="en-US" dirty="0"/>
           </a:p>
@@ -3801,7 +3810,7 @@
             <a:fld id="{B61BEF0D-F0BB-DE4B-95CE-6DB70DBA9567}" type="datetimeFigureOut">
               <a:rPr lang="en-US" dirty="0"/>
               <a:pPr/>
-              <a:t>12/3/2019</a:t>
+              <a:t>12/4/2019</a:t>
             </a:fld>
             <a:endParaRPr lang="en-US" dirty="0"/>
           </a:p>
@@ -3921,7 +3930,7 @@
             <a:fld id="{B61BEF0D-F0BB-DE4B-95CE-6DB70DBA9567}" type="datetimeFigureOut">
               <a:rPr lang="en-US" dirty="0"/>
               <a:pPr/>
-              <a:t>12/3/2019</a:t>
+              <a:t>12/4/2019</a:t>
             </a:fld>
             <a:endParaRPr lang="en-US" dirty="0"/>
           </a:p>
@@ -4013,7 +4022,7 @@
             <a:fld id="{B61BEF0D-F0BB-DE4B-95CE-6DB70DBA9567}" type="datetimeFigureOut">
               <a:rPr lang="en-US" dirty="0"/>
               <a:pPr/>
-              <a:t>12/3/2019</a:t>
+              <a:t>12/4/2019</a:t>
             </a:fld>
             <a:endParaRPr lang="en-US" dirty="0"/>
           </a:p>
@@ -4264,7 +4273,7 @@
           <a:p>
             <a:fld id="{42A54C80-263E-416B-A8E0-580EDEADCBDC}" type="datetimeFigureOut">
               <a:rPr lang="en-US" dirty="0"/>
-              <a:t>12/3/2019</a:t>
+              <a:t>12/4/2019</a:t>
             </a:fld>
             <a:endParaRPr lang="en-US" dirty="0"/>
           </a:p>
@@ -4566,7 +4575,7 @@
             <a:fld id="{B61BEF0D-F0BB-DE4B-95CE-6DB70DBA9567}" type="datetimeFigureOut">
               <a:rPr lang="en-US" dirty="0"/>
               <a:pPr/>
-              <a:t>12/3/2019</a:t>
+              <a:t>12/4/2019</a:t>
             </a:fld>
             <a:endParaRPr lang="en-US" dirty="0"/>
           </a:p>
@@ -5264,7 +5273,7 @@
             <a:fld id="{B61BEF0D-F0BB-DE4B-95CE-6DB70DBA9567}" type="datetimeFigureOut">
               <a:rPr lang="en-US" dirty="0"/>
               <a:pPr/>
-              <a:t>12/3/2019</a:t>
+              <a:t>12/4/2019</a:t>
             </a:fld>
             <a:endParaRPr lang="en-US" dirty="0"/>
           </a:p>
@@ -5885,6 +5894,520 @@
             <p:ph type="title"/>
           </p:nvPr>
         </p:nvSpPr>
+        <p:spPr/>
+        <p:txBody>
+          <a:bodyPr>
+            <a:normAutofit/>
+          </a:bodyPr>
+          <a:lstStyle/>
+          <a:p>
+            <a:pPr marL="571500" lvl="0" indent="-571500">
+              <a:buFont typeface="Arial" panose="020B0604020202020204" pitchFamily="34" charset="0"/>
+              <a:buChar char="•"/>
+            </a:pPr>
+            <a:r>
+              <a:rPr lang="en-US" sz="4400" b="1" dirty="0" smtClean="0"/>
+              <a:t>C</a:t>
+            </a:r>
+            <a:r>
+              <a:rPr lang="en-US" dirty="0" smtClean="0"/>
+              <a:t>heck</a:t>
+            </a:r>
+            <a:endParaRPr lang="es-CO" sz="3200" dirty="0"/>
+          </a:p>
+        </p:txBody>
+      </p:sp>
+      <p:sp>
+        <p:nvSpPr>
+          <p:cNvPr id="3" name="Marcador de contenido 2"/>
+          <p:cNvSpPr>
+            <a:spLocks noGrp="1"/>
+          </p:cNvSpPr>
+          <p:nvPr>
+            <p:ph idx="1"/>
+          </p:nvPr>
+        </p:nvSpPr>
+        <p:spPr>
+          <a:xfrm>
+            <a:off x="677334" y="1446910"/>
+            <a:ext cx="10741515" cy="4091005"/>
+          </a:xfrm>
+        </p:spPr>
+        <p:txBody>
+          <a:bodyPr>
+            <a:normAutofit/>
+          </a:bodyPr>
+          <a:lstStyle/>
+          <a:p>
+            <a:r>
+              <a:rPr lang="en-US" dirty="0"/>
+              <a:t>With this type of restriction, it is specified that the values ​​entered in the column must comply with the specified rule or formula</a:t>
+            </a:r>
+            <a:r>
+              <a:rPr lang="en-US" dirty="0" smtClean="0"/>
+              <a:t>.</a:t>
+            </a:r>
+          </a:p>
+          <a:p>
+            <a:r>
+              <a:rPr lang="en-US" dirty="0"/>
+              <a:t>Some requirements are:</a:t>
+            </a:r>
+            <a:endParaRPr lang="es-CO" dirty="0"/>
+          </a:p>
+          <a:p>
+            <a:pPr lvl="1"/>
+            <a:r>
+              <a:rPr lang="en-US" dirty="0"/>
+              <a:t>A column can have any number of CHECK restrictions.</a:t>
+            </a:r>
+            <a:endParaRPr lang="es-CO" dirty="0"/>
+          </a:p>
+          <a:p>
+            <a:pPr lvl="1"/>
+            <a:r>
+              <a:rPr lang="en-US" dirty="0"/>
+              <a:t>The search condition must be evaluated as a Boolean expression and cannot refer to another table.</a:t>
+            </a:r>
+            <a:endParaRPr lang="es-CO" dirty="0"/>
+          </a:p>
+          <a:p>
+            <a:pPr lvl="1"/>
+            <a:r>
+              <a:rPr lang="en-US" dirty="0"/>
+              <a:t>You cannot define CHECK restrictions in columns of type text, </a:t>
+            </a:r>
+            <a:r>
+              <a:rPr lang="en-US" dirty="0" err="1"/>
+              <a:t>ntext</a:t>
+            </a:r>
+            <a:r>
+              <a:rPr lang="en-US" dirty="0"/>
+              <a:t> or image</a:t>
+            </a:r>
+            <a:r>
+              <a:rPr lang="en-US" dirty="0" smtClean="0"/>
+              <a:t>.</a:t>
+            </a:r>
+          </a:p>
+          <a:p>
+            <a:r>
+              <a:rPr lang="en-US" dirty="0"/>
+              <a:t>Advantage:</a:t>
+            </a:r>
+            <a:endParaRPr lang="es-CO" dirty="0"/>
+          </a:p>
+          <a:p>
+            <a:pPr lvl="1"/>
+            <a:r>
+              <a:rPr lang="en-US" dirty="0"/>
+              <a:t>The expressions used are similar to those used in the WHERE clause.</a:t>
+            </a:r>
+            <a:endParaRPr lang="es-CO" dirty="0"/>
+          </a:p>
+          <a:p>
+            <a:pPr lvl="1"/>
+            <a:r>
+              <a:rPr lang="en-US" dirty="0"/>
+              <a:t>They can become a better alternative than TRIGGERS or triggers.</a:t>
+            </a:r>
+            <a:endParaRPr lang="es-CO" dirty="0"/>
+          </a:p>
+          <a:p>
+            <a:endParaRPr lang="es-CO" dirty="0"/>
+          </a:p>
+          <a:p>
+            <a:endParaRPr lang="es-CO" dirty="0"/>
+          </a:p>
+        </p:txBody>
+      </p:sp>
+    </p:spTree>
+    <p:extLst>
+      <p:ext uri="{BB962C8B-B14F-4D97-AF65-F5344CB8AC3E}">
+        <p14:creationId xmlns:p14="http://schemas.microsoft.com/office/powerpoint/2010/main" val="3634239986"/>
+      </p:ext>
+    </p:extLst>
+  </p:cSld>
+  <p:clrMapOvr>
+    <a:masterClrMapping/>
+  </p:clrMapOvr>
+</p:sld>
+</file>
+
+<file path=ppt/slides/slide11.xml><?xml version="1.0" encoding="utf-8"?>
+<p:sld xmlns:a="http://schemas.openxmlformats.org/drawingml/2006/main" xmlns:r="http://schemas.openxmlformats.org/officeDocument/2006/relationships" xmlns:p="http://schemas.openxmlformats.org/presentationml/2006/main">
+  <p:cSld>
+    <p:spTree>
+      <p:nvGrpSpPr>
+        <p:cNvPr id="1" name=""/>
+        <p:cNvGrpSpPr/>
+        <p:nvPr/>
+      </p:nvGrpSpPr>
+      <p:grpSpPr>
+        <a:xfrm>
+          <a:off x="0" y="0"/>
+          <a:ext cx="0" cy="0"/>
+          <a:chOff x="0" y="0"/>
+          <a:chExt cx="0" cy="0"/>
+        </a:xfrm>
+      </p:grpSpPr>
+      <p:sp>
+        <p:nvSpPr>
+          <p:cNvPr id="2" name="Título 1"/>
+          <p:cNvSpPr>
+            <a:spLocks noGrp="1"/>
+          </p:cNvSpPr>
+          <p:nvPr>
+            <p:ph type="title"/>
+          </p:nvPr>
+        </p:nvSpPr>
+        <p:spPr/>
+        <p:txBody>
+          <a:bodyPr>
+            <a:normAutofit/>
+          </a:bodyPr>
+          <a:lstStyle/>
+          <a:p>
+            <a:pPr marL="571500" lvl="0" indent="-571500">
+              <a:buFont typeface="Arial" panose="020B0604020202020204" pitchFamily="34" charset="0"/>
+              <a:buChar char="•"/>
+            </a:pPr>
+            <a:r>
+              <a:rPr lang="en-US" sz="4400" b="1" dirty="0" smtClean="0"/>
+              <a:t>D</a:t>
+            </a:r>
+            <a:r>
+              <a:rPr lang="en-US" dirty="0" smtClean="0"/>
+              <a:t>efault</a:t>
+            </a:r>
+            <a:endParaRPr lang="es-CO" sz="3200" dirty="0"/>
+          </a:p>
+        </p:txBody>
+      </p:sp>
+      <p:sp>
+        <p:nvSpPr>
+          <p:cNvPr id="3" name="Marcador de contenido 2"/>
+          <p:cNvSpPr>
+            <a:spLocks noGrp="1"/>
+          </p:cNvSpPr>
+          <p:nvPr>
+            <p:ph idx="1"/>
+          </p:nvPr>
+        </p:nvSpPr>
+        <p:spPr>
+          <a:xfrm>
+            <a:off x="677334" y="1446910"/>
+            <a:ext cx="10741515" cy="4091005"/>
+          </a:xfrm>
+        </p:spPr>
+        <p:txBody>
+          <a:bodyPr>
+            <a:normAutofit/>
+          </a:bodyPr>
+          <a:lstStyle/>
+          <a:p>
+            <a:r>
+              <a:rPr lang="en-US" dirty="0"/>
+              <a:t>It can be said that it is not a restriction, since only one value is entered in case no other is specified. </a:t>
+            </a:r>
+            <a:endParaRPr lang="en-US" dirty="0" smtClean="0"/>
+          </a:p>
+          <a:p>
+            <a:r>
+              <a:rPr lang="en-US" dirty="0" smtClean="0"/>
+              <a:t>If </a:t>
+            </a:r>
+            <a:r>
+              <a:rPr lang="en-US" dirty="0"/>
+              <a:t>a column allows NULL and the value to be inserted is not </a:t>
+            </a:r>
+            <a:r>
+              <a:rPr lang="en-US" dirty="0" smtClean="0"/>
+              <a:t>specified </a:t>
+            </a:r>
+          </a:p>
+          <a:p>
+            <a:r>
+              <a:rPr lang="en-US" dirty="0" smtClean="0"/>
+              <a:t>It </a:t>
+            </a:r>
+            <a:r>
+              <a:rPr lang="en-US" dirty="0"/>
+              <a:t>can be replaced with a default value</a:t>
+            </a:r>
+            <a:r>
+              <a:rPr lang="en-US" dirty="0" smtClean="0"/>
+              <a:t>.</a:t>
+            </a:r>
+            <a:endParaRPr lang="es-CO" dirty="0"/>
+          </a:p>
+          <a:p>
+            <a:endParaRPr lang="es-CO" dirty="0"/>
+          </a:p>
+          <a:p>
+            <a:endParaRPr lang="es-CO" dirty="0"/>
+          </a:p>
+        </p:txBody>
+      </p:sp>
+    </p:spTree>
+    <p:extLst>
+      <p:ext uri="{BB962C8B-B14F-4D97-AF65-F5344CB8AC3E}">
+        <p14:creationId xmlns:p14="http://schemas.microsoft.com/office/powerpoint/2010/main" val="1984455170"/>
+      </p:ext>
+    </p:extLst>
+  </p:cSld>
+  <p:clrMapOvr>
+    <a:masterClrMapping/>
+  </p:clrMapOvr>
+</p:sld>
+</file>
+
+<file path=ppt/slides/slide12.xml><?xml version="1.0" encoding="utf-8"?>
+<p:sld xmlns:a="http://schemas.openxmlformats.org/drawingml/2006/main" xmlns:r="http://schemas.openxmlformats.org/officeDocument/2006/relationships" xmlns:p="http://schemas.openxmlformats.org/presentationml/2006/main">
+  <p:cSld>
+    <p:spTree>
+      <p:nvGrpSpPr>
+        <p:cNvPr id="1" name=""/>
+        <p:cNvGrpSpPr/>
+        <p:nvPr/>
+      </p:nvGrpSpPr>
+      <p:grpSpPr>
+        <a:xfrm>
+          <a:off x="0" y="0"/>
+          <a:ext cx="0" cy="0"/>
+          <a:chOff x="0" y="0"/>
+          <a:chExt cx="0" cy="0"/>
+        </a:xfrm>
+      </p:grpSpPr>
+      <p:sp>
+        <p:nvSpPr>
+          <p:cNvPr id="2" name="Título 1"/>
+          <p:cNvSpPr>
+            <a:spLocks noGrp="1"/>
+          </p:cNvSpPr>
+          <p:nvPr>
+            <p:ph type="title"/>
+          </p:nvPr>
+        </p:nvSpPr>
+        <p:spPr>
+          <a:xfrm>
+            <a:off x="565822" y="197005"/>
+            <a:ext cx="9626393" cy="1320800"/>
+          </a:xfrm>
+        </p:spPr>
+        <p:txBody>
+          <a:bodyPr>
+            <a:normAutofit/>
+          </a:bodyPr>
+          <a:lstStyle/>
+          <a:p>
+            <a:pPr lvl="0"/>
+            <a:r>
+              <a:rPr lang="en-US" sz="4000" b="1" dirty="0"/>
+              <a:t>W</a:t>
+            </a:r>
+            <a:r>
+              <a:rPr lang="en-US" dirty="0"/>
+              <a:t>hat kind of data exists and what is each used </a:t>
+            </a:r>
+            <a:r>
+              <a:rPr lang="en-US" dirty="0" smtClean="0"/>
+              <a:t>for</a:t>
+            </a:r>
+            <a:r>
+              <a:rPr lang="es-CO" dirty="0" smtClean="0"/>
+              <a:t>?</a:t>
+            </a:r>
+            <a:endParaRPr lang="es-CO" dirty="0"/>
+          </a:p>
+        </p:txBody>
+      </p:sp>
+      <p:sp>
+        <p:nvSpPr>
+          <p:cNvPr id="8" name="Marcador de contenido 7"/>
+          <p:cNvSpPr>
+            <a:spLocks noGrp="1"/>
+          </p:cNvSpPr>
+          <p:nvPr>
+            <p:ph idx="1"/>
+          </p:nvPr>
+        </p:nvSpPr>
+        <p:spPr/>
+        <p:txBody>
+          <a:bodyPr/>
+          <a:lstStyle/>
+          <a:p>
+            <a:endParaRPr lang="es-CO"/>
+          </a:p>
+        </p:txBody>
+      </p:sp>
+      <p:pic>
+        <p:nvPicPr>
+          <p:cNvPr id="10" name="Imagen 9"/>
+          <p:cNvPicPr>
+            <a:picLocks noChangeAspect="1"/>
+          </p:cNvPicPr>
+          <p:nvPr/>
+        </p:nvPicPr>
+        <p:blipFill>
+          <a:blip r:embed="rId2"/>
+          <a:stretch>
+            <a:fillRect/>
+          </a:stretch>
+        </p:blipFill>
+        <p:spPr>
+          <a:xfrm>
+            <a:off x="369446" y="1816463"/>
+            <a:ext cx="10985511" cy="4569023"/>
+          </a:xfrm>
+          <a:prstGeom prst="rect">
+            <a:avLst/>
+          </a:prstGeom>
+        </p:spPr>
+      </p:pic>
+    </p:spTree>
+    <p:extLst>
+      <p:ext uri="{BB962C8B-B14F-4D97-AF65-F5344CB8AC3E}">
+        <p14:creationId xmlns:p14="http://schemas.microsoft.com/office/powerpoint/2010/main" val="1356633548"/>
+      </p:ext>
+    </p:extLst>
+  </p:cSld>
+  <p:clrMapOvr>
+    <a:masterClrMapping/>
+  </p:clrMapOvr>
+</p:sld>
+</file>
+
+<file path=ppt/slides/slide13.xml><?xml version="1.0" encoding="utf-8"?>
+<p:sld xmlns:a="http://schemas.openxmlformats.org/drawingml/2006/main" xmlns:r="http://schemas.openxmlformats.org/officeDocument/2006/relationships" xmlns:p="http://schemas.openxmlformats.org/presentationml/2006/main">
+  <p:cSld>
+    <p:spTree>
+      <p:nvGrpSpPr>
+        <p:cNvPr id="1" name=""/>
+        <p:cNvGrpSpPr/>
+        <p:nvPr/>
+      </p:nvGrpSpPr>
+      <p:grpSpPr>
+        <a:xfrm>
+          <a:off x="0" y="0"/>
+          <a:ext cx="0" cy="0"/>
+          <a:chOff x="0" y="0"/>
+          <a:chExt cx="0" cy="0"/>
+        </a:xfrm>
+      </p:grpSpPr>
+      <p:sp>
+        <p:nvSpPr>
+          <p:cNvPr id="2" name="Título 1"/>
+          <p:cNvSpPr>
+            <a:spLocks noGrp="1"/>
+          </p:cNvSpPr>
+          <p:nvPr>
+            <p:ph type="title"/>
+          </p:nvPr>
+        </p:nvSpPr>
+        <p:spPr>
+          <a:xfrm>
+            <a:off x="565822" y="197005"/>
+            <a:ext cx="9626393" cy="1320800"/>
+          </a:xfrm>
+        </p:spPr>
+        <p:txBody>
+          <a:bodyPr>
+            <a:normAutofit/>
+          </a:bodyPr>
+          <a:lstStyle/>
+          <a:p>
+            <a:pPr lvl="0"/>
+            <a:r>
+              <a:rPr lang="en-US" sz="4000" b="1" dirty="0" smtClean="0"/>
+              <a:t>W</a:t>
+            </a:r>
+            <a:r>
+              <a:rPr lang="en-US" dirty="0" smtClean="0"/>
+              <a:t>hat </a:t>
+            </a:r>
+            <a:r>
+              <a:rPr lang="en-US" dirty="0"/>
+              <a:t>kind of data exists and what is each used </a:t>
+            </a:r>
+            <a:r>
+              <a:rPr lang="en-US" dirty="0" smtClean="0"/>
+              <a:t>for</a:t>
+            </a:r>
+            <a:r>
+              <a:rPr lang="es-CO" dirty="0" smtClean="0"/>
+              <a:t>?</a:t>
+            </a:r>
+            <a:endParaRPr lang="es-CO" dirty="0"/>
+          </a:p>
+        </p:txBody>
+      </p:sp>
+      <p:pic>
+        <p:nvPicPr>
+          <p:cNvPr id="3" name="Marcador de contenido 2"/>
+          <p:cNvPicPr>
+            <a:picLocks noGrp="1" noChangeAspect="1"/>
+          </p:cNvPicPr>
+          <p:nvPr>
+            <p:ph idx="1"/>
+          </p:nvPr>
+        </p:nvPicPr>
+        <p:blipFill>
+          <a:blip r:embed="rId2"/>
+          <a:stretch>
+            <a:fillRect/>
+          </a:stretch>
+        </p:blipFill>
+        <p:spPr>
+          <a:xfrm>
+            <a:off x="688485" y="1435759"/>
+            <a:ext cx="10239710" cy="5244769"/>
+          </a:xfrm>
+          <a:prstGeom prst="rect">
+            <a:avLst/>
+          </a:prstGeom>
+        </p:spPr>
+      </p:pic>
+    </p:spTree>
+    <p:extLst>
+      <p:ext uri="{BB962C8B-B14F-4D97-AF65-F5344CB8AC3E}">
+        <p14:creationId xmlns:p14="http://schemas.microsoft.com/office/powerpoint/2010/main" val="1894069305"/>
+      </p:ext>
+    </p:extLst>
+  </p:cSld>
+  <p:clrMapOvr>
+    <a:masterClrMapping/>
+  </p:clrMapOvr>
+</p:sld>
+</file>
+
+<file path=ppt/slides/slide14.xml><?xml version="1.0" encoding="utf-8"?>
+<p:sld xmlns:a="http://schemas.openxmlformats.org/drawingml/2006/main" xmlns:r="http://schemas.openxmlformats.org/officeDocument/2006/relationships" xmlns:p="http://schemas.openxmlformats.org/presentationml/2006/main">
+  <p:cSld>
+    <p:spTree>
+      <p:nvGrpSpPr>
+        <p:cNvPr id="1" name=""/>
+        <p:cNvGrpSpPr/>
+        <p:nvPr/>
+      </p:nvGrpSpPr>
+      <p:grpSpPr>
+        <a:xfrm>
+          <a:off x="0" y="0"/>
+          <a:ext cx="0" cy="0"/>
+          <a:chOff x="0" y="0"/>
+          <a:chExt cx="0" cy="0"/>
+        </a:xfrm>
+      </p:grpSpPr>
+      <p:sp>
+        <p:nvSpPr>
+          <p:cNvPr id="2" name="Título 1"/>
+          <p:cNvSpPr>
+            <a:spLocks noGrp="1"/>
+          </p:cNvSpPr>
+          <p:nvPr>
+            <p:ph type="title"/>
+          </p:nvPr>
+        </p:nvSpPr>
         <p:spPr>
           <a:xfrm>
             <a:off x="323385" y="275063"/>
@@ -7587,14 +8110,6 @@
               </a:rPr>
               <a:t>;</a:t>
             </a:r>
-            <a:endParaRPr lang="en-US" i="1" dirty="0">
-              <a:solidFill>
-                <a:schemeClr val="tx1">
-                  <a:lumMod val="65000"/>
-                  <a:lumOff val="35000"/>
-                </a:schemeClr>
-              </a:solidFill>
-            </a:endParaRPr>
           </a:p>
         </p:txBody>
       </p:sp>
@@ -8211,11 +8726,11 @@
               <a:buChar char="•"/>
             </a:pPr>
             <a:r>
-              <a:rPr lang="en-US" b="1" dirty="0"/>
+              <a:rPr lang="en-US" sz="4400" b="1" dirty="0"/>
               <a:t>P</a:t>
             </a:r>
             <a:r>
-              <a:rPr lang="en-US" sz="3200" dirty="0"/>
+              <a:rPr lang="en-US" dirty="0"/>
               <a:t>RIMARY KEY.</a:t>
             </a:r>
             <a:endParaRPr lang="es-CO" sz="3200" dirty="0"/>
@@ -8234,8 +8749,8 @@
         </p:nvSpPr>
         <p:spPr>
           <a:xfrm>
-            <a:off x="677334" y="1458062"/>
-            <a:ext cx="11076051" cy="5210367"/>
+            <a:off x="677334" y="1446910"/>
+            <a:ext cx="10741515" cy="5210367"/>
           </a:xfrm>
         </p:spPr>
         <p:txBody>
@@ -8245,82 +8760,165 @@
           <a:lstStyle/>
           <a:p>
             <a:r>
-              <a:rPr lang="en-US" dirty="0"/>
+              <a:rPr lang="en-US" sz="2000" dirty="0"/>
               <a:t>It is the most </a:t>
             </a:r>
             <a:r>
-              <a:rPr lang="en-US" dirty="0" smtClean="0"/>
+              <a:rPr lang="en-US" sz="2000" dirty="0" smtClean="0"/>
               <a:t>common of all.</a:t>
             </a:r>
           </a:p>
           <a:p>
             <a:r>
-              <a:rPr lang="en-US" dirty="0" smtClean="0"/>
-              <a:t>To be a relational database its tables must always have a primary key to identify that row than others.</a:t>
-            </a:r>
-          </a:p>
-          <a:p>
-            <a:r>
-              <a:rPr lang="en-US" dirty="0"/>
+              <a:rPr lang="en-US" sz="2000" dirty="0" smtClean="0"/>
+              <a:t>To be a </a:t>
+            </a:r>
+            <a:r>
+              <a:rPr lang="en-US" sz="2000" dirty="0" smtClean="0"/>
+              <a:t>relational table </a:t>
+            </a:r>
+            <a:r>
+              <a:rPr lang="en-US" sz="2000" dirty="0" smtClean="0"/>
+              <a:t>must always have a primary key to </a:t>
+            </a:r>
+            <a:r>
+              <a:rPr lang="en-US" sz="2000" dirty="0" smtClean="0"/>
+              <a:t>identify that identify that </a:t>
+            </a:r>
+            <a:r>
+              <a:rPr lang="en-US" sz="2000" dirty="0" smtClean="0"/>
+              <a:t>row </a:t>
+            </a:r>
+            <a:r>
+              <a:rPr lang="en-US" sz="2000" dirty="0" smtClean="0"/>
+              <a:t>as UNIQUE.</a:t>
+            </a:r>
+            <a:endParaRPr lang="en-US" sz="2000" dirty="0" smtClean="0"/>
+          </a:p>
+          <a:p>
+            <a:r>
+              <a:rPr lang="en-US" sz="2000" dirty="0"/>
               <a:t>It is possible to add more columns as part of a primary </a:t>
             </a:r>
             <a:r>
-              <a:rPr lang="en-US" dirty="0" smtClean="0"/>
-              <a:t>key</a:t>
-            </a:r>
-          </a:p>
-          <a:p>
-            <a:endParaRPr lang="en-US" dirty="0"/>
+              <a:rPr lang="en-US" sz="2000" dirty="0" smtClean="0"/>
+              <a:t>key.</a:t>
+            </a:r>
+            <a:endParaRPr lang="en-US" sz="2000" dirty="0" smtClean="0"/>
+          </a:p>
+          <a:p>
+            <a:pPr lvl="3"/>
+            <a:r>
+              <a:rPr lang="en-US" sz="1400" dirty="0" smtClean="0"/>
+              <a:t>To </a:t>
+            </a:r>
+            <a:r>
+              <a:rPr lang="en-US" sz="1400" dirty="0"/>
+              <a:t>use a nomenclature in the name of the </a:t>
+            </a:r>
+            <a:r>
+              <a:rPr lang="en-US" sz="1400" dirty="0" smtClean="0"/>
+              <a:t>restriction is a good practice.</a:t>
+            </a:r>
+          </a:p>
+          <a:p>
+            <a:pPr lvl="3"/>
+            <a:endParaRPr lang="en-US" sz="1400" dirty="0" smtClean="0"/>
+          </a:p>
+          <a:p>
+            <a:r>
+              <a:rPr lang="en-US" sz="2000" dirty="0"/>
+              <a:t>Each time we generate a primary key, it creates an index type of clustered automatically</a:t>
+            </a:r>
+            <a:r>
+              <a:rPr lang="en-US" sz="2000" dirty="0" smtClean="0"/>
+              <a:t>.</a:t>
+            </a:r>
+            <a:endParaRPr lang="en-US" sz="2000" dirty="0"/>
           </a:p>
           <a:p>
             <a:pPr lvl="1"/>
             <a:r>
-              <a:rPr lang="en-US" dirty="0"/>
-              <a:t>PRIMARY KEY.</a:t>
-            </a:r>
+              <a:rPr lang="en-US" sz="1800" dirty="0"/>
+              <a:t>The column (s) used in a PRIMARY KEY constraint cannot accept NULL</a:t>
+            </a:r>
+            <a:r>
+              <a:rPr lang="en-US" sz="1800" dirty="0" smtClean="0"/>
+              <a:t>.</a:t>
+            </a:r>
+          </a:p>
+          <a:p>
+            <a:pPr lvl="1"/>
+            <a:r>
+              <a:rPr lang="en-US" sz="1800" dirty="0"/>
+              <a:t>You cannot repeat values ​​in the column (s), they must be unique.</a:t>
+            </a:r>
+            <a:endParaRPr lang="es-CO" sz="1800" dirty="0"/>
+          </a:p>
+          <a:p>
+            <a:pPr lvl="1"/>
+            <a:r>
+              <a:rPr lang="en-US" sz="1800" dirty="0"/>
+              <a:t>Only one PRIMARY KEY type constraint can exist for each table.</a:t>
+            </a:r>
+            <a:endParaRPr lang="es-CO" sz="1800" dirty="0"/>
+          </a:p>
+          <a:p>
+            <a:pPr marL="0" indent="0">
+              <a:buNone/>
+            </a:pPr>
             <a:endParaRPr lang="es-CO" dirty="0"/>
           </a:p>
-          <a:p>
-            <a:pPr lvl="1"/>
-            <a:r>
-              <a:rPr lang="en-US" dirty="0"/>
-              <a:t>UNIQUE.</a:t>
-            </a:r>
-            <a:endParaRPr lang="es-CO" dirty="0"/>
-          </a:p>
-          <a:p>
-            <a:pPr lvl="1"/>
-            <a:r>
-              <a:rPr lang="en-US" dirty="0"/>
-              <a:t>FOREIGN KEY.</a:t>
-            </a:r>
-            <a:endParaRPr lang="es-CO" dirty="0"/>
-          </a:p>
-          <a:p>
-            <a:pPr lvl="1"/>
-            <a:r>
-              <a:rPr lang="en-US" dirty="0"/>
-              <a:t>CHECK.</a:t>
-            </a:r>
-            <a:endParaRPr lang="es-CO" dirty="0"/>
-          </a:p>
-          <a:p>
-            <a:pPr lvl="1"/>
-            <a:r>
-              <a:rPr lang="en-US" dirty="0" smtClean="0"/>
-              <a:t>DEFAULT</a:t>
-            </a:r>
-            <a:r>
-              <a:rPr lang="es-CO" dirty="0"/>
-              <a:t>.</a:t>
-            </a:r>
-            <a:endParaRPr lang="en-US" dirty="0" smtClean="0"/>
-          </a:p>
-          <a:p>
-            <a:endParaRPr lang="es-CO" dirty="0"/>
-          </a:p>
-        </p:txBody>
-      </p:sp>
+        </p:txBody>
+      </p:sp>
+      <p:pic>
+        <p:nvPicPr>
+          <p:cNvPr id="11" name="Imagen 10"/>
+          <p:cNvPicPr>
+            <a:picLocks noChangeAspect="1"/>
+          </p:cNvPicPr>
+          <p:nvPr/>
+        </p:nvPicPr>
+        <p:blipFill>
+          <a:blip r:embed="rId2"/>
+          <a:stretch>
+            <a:fillRect/>
+          </a:stretch>
+        </p:blipFill>
+        <p:spPr>
+          <a:xfrm>
+            <a:off x="6322741" y="322498"/>
+            <a:ext cx="4340495" cy="1422667"/>
+          </a:xfrm>
+          <a:prstGeom prst="rect">
+            <a:avLst/>
+          </a:prstGeom>
+        </p:spPr>
+      </p:pic>
+      <p:pic>
+        <p:nvPicPr>
+          <p:cNvPr id="12" name="Imagen 11"/>
+          <p:cNvPicPr>
+            <a:picLocks noChangeAspect="1"/>
+          </p:cNvPicPr>
+          <p:nvPr/>
+        </p:nvPicPr>
+        <p:blipFill>
+          <a:blip r:embed="rId3"/>
+          <a:stretch>
+            <a:fillRect/>
+          </a:stretch>
+        </p:blipFill>
+        <p:spPr>
+          <a:xfrm>
+            <a:off x="3205199" y="5625749"/>
+            <a:ext cx="5685784" cy="1031528"/>
+          </a:xfrm>
+          <a:prstGeom prst="rect">
+            <a:avLst/>
+          </a:prstGeom>
+        </p:spPr>
+      </p:pic>
     </p:spTree>
     <p:extLst>
       <p:ext uri="{BB962C8B-B14F-4D97-AF65-F5344CB8AC3E}">
@@ -8361,61 +8959,122 @@
             <p:ph type="title"/>
           </p:nvPr>
         </p:nvSpPr>
-        <p:spPr>
-          <a:xfrm>
-            <a:off x="565822" y="197005"/>
-            <a:ext cx="9626393" cy="1320800"/>
-          </a:xfrm>
-        </p:spPr>
+        <p:spPr/>
         <p:txBody>
           <a:bodyPr>
             <a:normAutofit/>
           </a:bodyPr>
           <a:lstStyle/>
           <a:p>
-            <a:pPr lvl="0"/>
-            <a:r>
-              <a:rPr lang="en-US" sz="4000" b="1" dirty="0"/>
-              <a:t>W</a:t>
+            <a:pPr marL="571500" lvl="0" indent="-571500">
+              <a:buFont typeface="Arial" panose="020B0604020202020204" pitchFamily="34" charset="0"/>
+              <a:buChar char="•"/>
+            </a:pPr>
+            <a:r>
+              <a:rPr lang="en-US" sz="4400" b="1" dirty="0"/>
+              <a:t>U</a:t>
             </a:r>
             <a:r>
               <a:rPr lang="en-US" dirty="0"/>
-              <a:t>hat kind of data exists and what is each used </a:t>
-            </a:r>
-            <a:r>
-              <a:rPr lang="en-US" dirty="0" smtClean="0"/>
-              <a:t>for</a:t>
-            </a:r>
-            <a:r>
-              <a:rPr lang="es-CO" dirty="0" smtClean="0"/>
-              <a:t>?</a:t>
-            </a:r>
+              <a:t>NIQUE</a:t>
+            </a:r>
+            <a:endParaRPr lang="es-CO" sz="3200" dirty="0"/>
+          </a:p>
+        </p:txBody>
+      </p:sp>
+      <p:sp>
+        <p:nvSpPr>
+          <p:cNvPr id="3" name="Marcador de contenido 2"/>
+          <p:cNvSpPr>
+            <a:spLocks noGrp="1"/>
+          </p:cNvSpPr>
+          <p:nvPr>
+            <p:ph idx="1"/>
+          </p:nvPr>
+        </p:nvSpPr>
+        <p:spPr>
+          <a:xfrm>
+            <a:off x="677334" y="1446910"/>
+            <a:ext cx="10741515" cy="2790553"/>
+          </a:xfrm>
+        </p:spPr>
+        <p:txBody>
+          <a:bodyPr>
+            <a:normAutofit/>
+          </a:bodyPr>
+          <a:lstStyle/>
+          <a:p>
+            <a:r>
+              <a:rPr lang="en-US" sz="2400" dirty="0"/>
+              <a:t>This type of restriction is very similar to </a:t>
+            </a:r>
+            <a:r>
+              <a:rPr lang="en-US" sz="2400" dirty="0" smtClean="0"/>
+              <a:t>PRIMARY KEY.</a:t>
+            </a:r>
+            <a:endParaRPr lang="en-US" sz="2400" dirty="0" smtClean="0"/>
+          </a:p>
+          <a:p>
+            <a:r>
+              <a:rPr lang="en-US" sz="2400" dirty="0"/>
+              <a:t>T</a:t>
+            </a:r>
+            <a:r>
+              <a:rPr lang="en-US" sz="2400" dirty="0" smtClean="0"/>
+              <a:t>he </a:t>
+            </a:r>
+            <a:r>
+              <a:rPr lang="en-US" sz="2400" dirty="0"/>
+              <a:t>differences are as follows</a:t>
+            </a:r>
+            <a:r>
+              <a:rPr lang="en-US" sz="2400" dirty="0" smtClean="0"/>
+              <a:t>:</a:t>
+            </a:r>
+          </a:p>
+          <a:p>
+            <a:pPr lvl="1"/>
+            <a:r>
+              <a:rPr lang="en-US" sz="1800" dirty="0"/>
+              <a:t>It </a:t>
+            </a:r>
+            <a:r>
+              <a:rPr lang="en-US" sz="1800" dirty="0" smtClean="0"/>
+              <a:t>also </a:t>
+            </a:r>
+            <a:r>
+              <a:rPr lang="en-US" sz="1800" dirty="0"/>
+              <a:t>generates an index automatically but is of the NON CLUSTERED type.</a:t>
+            </a:r>
+            <a:endParaRPr lang="es-CO" sz="1800" dirty="0"/>
+          </a:p>
+          <a:p>
+            <a:pPr lvl="1"/>
+            <a:r>
+              <a:rPr lang="en-US" sz="1800" dirty="0"/>
+              <a:t>The table can have more than one UNIQUE type constraint.</a:t>
+            </a:r>
+            <a:endParaRPr lang="es-CO" sz="1800" dirty="0"/>
+          </a:p>
+          <a:p>
+            <a:pPr lvl="1"/>
+            <a:r>
+              <a:rPr lang="en-US" sz="1800" dirty="0"/>
+              <a:t>If you can accept NULL, but only one row can contain it since, as the name implies, it is UNIQUE or unique.</a:t>
+            </a:r>
+            <a:endParaRPr lang="es-CO" sz="1800" dirty="0"/>
+          </a:p>
+          <a:p>
+            <a:pPr marL="0" indent="0">
+              <a:buNone/>
+            </a:pPr>
             <a:endParaRPr lang="es-CO" dirty="0"/>
-          </a:p>
-        </p:txBody>
-      </p:sp>
-      <p:sp>
-        <p:nvSpPr>
-          <p:cNvPr id="8" name="Marcador de contenido 7"/>
-          <p:cNvSpPr>
-            <a:spLocks noGrp="1"/>
-          </p:cNvSpPr>
-          <p:nvPr>
-            <p:ph idx="1"/>
-          </p:nvPr>
-        </p:nvSpPr>
-        <p:spPr/>
-        <p:txBody>
-          <a:bodyPr/>
-          <a:lstStyle/>
-          <a:p>
-            <a:endParaRPr lang="es-CO"/>
           </a:p>
         </p:txBody>
       </p:sp>
       <p:pic>
         <p:nvPicPr>
-          <p:cNvPr id="10" name="Imagen 9"/>
+          <p:cNvPr id="5" name="Imagen 4"/>
           <p:cNvPicPr>
             <a:picLocks noChangeAspect="1"/>
           </p:cNvPicPr>
@@ -8429,8 +9088,8 @@
         </p:blipFill>
         <p:spPr>
           <a:xfrm>
-            <a:off x="369446" y="1816463"/>
-            <a:ext cx="10985511" cy="4569023"/>
+            <a:off x="4028791" y="4280884"/>
+            <a:ext cx="4038600" cy="933450"/>
           </a:xfrm>
           <a:prstGeom prst="rect">
             <a:avLst/>
@@ -8440,7 +9099,7 @@
     </p:spTree>
     <p:extLst>
       <p:ext uri="{BB962C8B-B14F-4D97-AF65-F5344CB8AC3E}">
-        <p14:creationId xmlns:p14="http://schemas.microsoft.com/office/powerpoint/2010/main" val="1356633548"/>
+        <p14:creationId xmlns:p14="http://schemas.microsoft.com/office/powerpoint/2010/main" val="3630512266"/>
       </p:ext>
     </p:extLst>
   </p:cSld>
@@ -8477,73 +9136,132 @@
             <p:ph type="title"/>
           </p:nvPr>
         </p:nvSpPr>
-        <p:spPr>
-          <a:xfrm>
-            <a:off x="565822" y="197005"/>
-            <a:ext cx="9626393" cy="1320800"/>
-          </a:xfrm>
-        </p:spPr>
+        <p:spPr/>
         <p:txBody>
           <a:bodyPr>
             <a:normAutofit/>
           </a:bodyPr>
           <a:lstStyle/>
           <a:p>
-            <a:pPr lvl="0"/>
-            <a:r>
-              <a:rPr lang="en-US" sz="4000" b="1" dirty="0" smtClean="0"/>
-              <a:t>W</a:t>
+            <a:pPr marL="571500" lvl="0" indent="-571500">
+              <a:buFont typeface="Arial" panose="020B0604020202020204" pitchFamily="34" charset="0"/>
+              <a:buChar char="•"/>
+            </a:pPr>
+            <a:r>
+              <a:rPr lang="en-US" sz="4400" b="1" dirty="0" smtClean="0"/>
+              <a:t>F</a:t>
             </a:r>
             <a:r>
               <a:rPr lang="en-US" dirty="0" smtClean="0"/>
-              <a:t>hat </a:t>
+              <a:t>OREIGN </a:t>
             </a:r>
             <a:r>
               <a:rPr lang="en-US" dirty="0"/>
-              <a:t>kind of data exists and what is each used </a:t>
-            </a:r>
-            <a:r>
-              <a:rPr lang="en-US" dirty="0" smtClean="0"/>
-              <a:t>for</a:t>
-            </a:r>
-            <a:r>
-              <a:rPr lang="es-CO" dirty="0" smtClean="0"/>
-              <a:t>?</a:t>
-            </a:r>
-            <a:endParaRPr lang="es-CO" dirty="0"/>
-          </a:p>
-        </p:txBody>
-      </p:sp>
-      <p:pic>
-        <p:nvPicPr>
+              <a:t>KEY</a:t>
+            </a:r>
+            <a:endParaRPr lang="es-CO" sz="3200" dirty="0"/>
+          </a:p>
+        </p:txBody>
+      </p:sp>
+      <p:sp>
+        <p:nvSpPr>
           <p:cNvPr id="3" name="Marcador de contenido 2"/>
-          <p:cNvPicPr>
-            <a:picLocks noGrp="1" noChangeAspect="1"/>
-          </p:cNvPicPr>
+          <p:cNvSpPr>
+            <a:spLocks noGrp="1"/>
+          </p:cNvSpPr>
           <p:nvPr>
             <p:ph idx="1"/>
           </p:nvPr>
-        </p:nvPicPr>
-        <p:blipFill>
-          <a:blip r:embed="rId2"/>
-          <a:stretch>
-            <a:fillRect/>
-          </a:stretch>
-        </p:blipFill>
+        </p:nvSpPr>
         <p:spPr>
           <a:xfrm>
-            <a:off x="688485" y="1435759"/>
-            <a:ext cx="10239710" cy="5244769"/>
+            <a:off x="677334" y="1446910"/>
+            <a:ext cx="10741515" cy="4091005"/>
           </a:xfrm>
-          <a:prstGeom prst="rect">
-            <a:avLst/>
-          </a:prstGeom>
         </p:spPr>
-      </p:pic>
+        <p:txBody>
+          <a:bodyPr>
+            <a:normAutofit/>
+          </a:bodyPr>
+          <a:lstStyle/>
+          <a:p>
+            <a:r>
+              <a:rPr lang="en-US" dirty="0"/>
+              <a:t>It is formed of a column or the combination of several columns of a table that serves as a link to another table where in the </a:t>
+            </a:r>
+            <a:r>
+              <a:rPr lang="en-US" dirty="0" smtClean="0"/>
+              <a:t>latter.</a:t>
+            </a:r>
+          </a:p>
+          <a:p>
+            <a:r>
+              <a:rPr lang="en-US" dirty="0"/>
+              <a:t>A foreign key does not create an index automatically, so it is recommended to generate one to increase the query performance</a:t>
+            </a:r>
+            <a:r>
+              <a:rPr lang="en-US" dirty="0" smtClean="0"/>
+              <a:t>.</a:t>
+            </a:r>
+            <a:endParaRPr lang="es-CO" dirty="0"/>
+          </a:p>
+          <a:p>
+            <a:r>
+              <a:rPr lang="en-US" dirty="0"/>
+              <a:t>Some requirements for the FOREIGN KEY restriction:</a:t>
+            </a:r>
+            <a:endParaRPr lang="es-CO" dirty="0"/>
+          </a:p>
+          <a:p>
+            <a:pPr lvl="1"/>
+            <a:r>
+              <a:rPr lang="en-US" dirty="0"/>
+              <a:t>The values ​​entered in the foreign key column (s) must exist in the table referred to in the primary key column (s).</a:t>
+            </a:r>
+            <a:endParaRPr lang="es-CO" dirty="0"/>
+          </a:p>
+          <a:p>
+            <a:pPr lvl="1"/>
+            <a:r>
+              <a:rPr lang="en-US" dirty="0"/>
+              <a:t>You can only refer to primary keys of tables that are within the same database.</a:t>
+            </a:r>
+            <a:endParaRPr lang="es-CO" dirty="0"/>
+          </a:p>
+          <a:p>
+            <a:pPr lvl="1"/>
+            <a:r>
+              <a:rPr lang="en-US" dirty="0"/>
+              <a:t>You can refer to other columns in the same table.</a:t>
+            </a:r>
+            <a:endParaRPr lang="es-CO" dirty="0"/>
+          </a:p>
+          <a:p>
+            <a:pPr lvl="1"/>
+            <a:r>
+              <a:rPr lang="en-US" dirty="0"/>
+              <a:t>You can only refer to PRIMARY KEY or UNIQUE constraint columns.</a:t>
+            </a:r>
+            <a:endParaRPr lang="es-CO" dirty="0"/>
+          </a:p>
+          <a:p>
+            <a:pPr lvl="1"/>
+            <a:r>
+              <a:rPr lang="en-US" dirty="0"/>
+              <a:t>It cannot be used in temporary tables</a:t>
+            </a:r>
+            <a:r>
+              <a:rPr lang="en-US" dirty="0" smtClean="0"/>
+              <a:t>.</a:t>
+            </a:r>
+            <a:endParaRPr lang="es-CO" dirty="0"/>
+          </a:p>
+        </p:txBody>
+      </p:sp>
     </p:spTree>
     <p:extLst>
       <p:ext uri="{BB962C8B-B14F-4D97-AF65-F5344CB8AC3E}">
-        <p14:creationId xmlns:p14="http://schemas.microsoft.com/office/powerpoint/2010/main" val="1894069305"/>
+        <p14:creationId xmlns:p14="http://schemas.microsoft.com/office/powerpoint/2010/main" val="1160875213"/>
       </p:ext>
     </p:extLst>
   </p:cSld>

</xml_diff>